<commit_message>
Files have been added
</commit_message>
<xml_diff>
--- a/2/Web ծրագրավորման դասընթաց - Դաս 2.pptx
+++ b/2/Web ծրագրավորման դասընթաց - Դաս 2.pptx
@@ -21,9 +21,13 @@
     <p:sldId id="259" r:id="rId15"/>
     <p:sldId id="269" r:id="rId16"/>
     <p:sldId id="270" r:id="rId17"/>
-    <p:sldId id="271" r:id="rId18"/>
-    <p:sldId id="273" r:id="rId19"/>
-    <p:sldId id="274" r:id="rId20"/>
+    <p:sldId id="276" r:id="rId18"/>
+    <p:sldId id="277" r:id="rId19"/>
+    <p:sldId id="271" r:id="rId20"/>
+    <p:sldId id="278" r:id="rId21"/>
+    <p:sldId id="279" r:id="rId22"/>
+    <p:sldId id="273" r:id="rId23"/>
+    <p:sldId id="274" r:id="rId24"/>
   </p:sldIdLst>
   <p:sldSz cx="12192000" cy="6858000"/>
   <p:notesSz cx="6858000" cy="9144000"/>
@@ -277,7 +281,7 @@
           <a:p>
             <a:fld id="{B054DD91-EB8A-463F-8F8B-D25AE6D5CF75}" type="datetimeFigureOut">
               <a:rPr lang="en-US" smtClean="0"/>
-              <a:t>5/13/2020</a:t>
+              <a:t>5/18/2020</a:t>
             </a:fld>
             <a:endParaRPr lang="en-US"/>
           </a:p>
@@ -475,7 +479,7 @@
           <a:p>
             <a:fld id="{B054DD91-EB8A-463F-8F8B-D25AE6D5CF75}" type="datetimeFigureOut">
               <a:rPr lang="en-US" smtClean="0"/>
-              <a:t>5/13/2020</a:t>
+              <a:t>5/18/2020</a:t>
             </a:fld>
             <a:endParaRPr lang="en-US"/>
           </a:p>
@@ -683,7 +687,7 @@
           <a:p>
             <a:fld id="{B054DD91-EB8A-463F-8F8B-D25AE6D5CF75}" type="datetimeFigureOut">
               <a:rPr lang="en-US" smtClean="0"/>
-              <a:t>5/13/2020</a:t>
+              <a:t>5/18/2020</a:t>
             </a:fld>
             <a:endParaRPr lang="en-US"/>
           </a:p>
@@ -881,7 +885,7 @@
           <a:p>
             <a:fld id="{B054DD91-EB8A-463F-8F8B-D25AE6D5CF75}" type="datetimeFigureOut">
               <a:rPr lang="en-US" smtClean="0"/>
-              <a:t>5/13/2020</a:t>
+              <a:t>5/18/2020</a:t>
             </a:fld>
             <a:endParaRPr lang="en-US"/>
           </a:p>
@@ -1156,7 +1160,7 @@
           <a:p>
             <a:fld id="{B054DD91-EB8A-463F-8F8B-D25AE6D5CF75}" type="datetimeFigureOut">
               <a:rPr lang="en-US" smtClean="0"/>
-              <a:t>5/13/2020</a:t>
+              <a:t>5/18/2020</a:t>
             </a:fld>
             <a:endParaRPr lang="en-US"/>
           </a:p>
@@ -1421,7 +1425,7 @@
           <a:p>
             <a:fld id="{B054DD91-EB8A-463F-8F8B-D25AE6D5CF75}" type="datetimeFigureOut">
               <a:rPr lang="en-US" smtClean="0"/>
-              <a:t>5/13/2020</a:t>
+              <a:t>5/18/2020</a:t>
             </a:fld>
             <a:endParaRPr lang="en-US"/>
           </a:p>
@@ -1833,7 +1837,7 @@
           <a:p>
             <a:fld id="{B054DD91-EB8A-463F-8F8B-D25AE6D5CF75}" type="datetimeFigureOut">
               <a:rPr lang="en-US" smtClean="0"/>
-              <a:t>5/13/2020</a:t>
+              <a:t>5/18/2020</a:t>
             </a:fld>
             <a:endParaRPr lang="en-US"/>
           </a:p>
@@ -1974,7 +1978,7 @@
           <a:p>
             <a:fld id="{B054DD91-EB8A-463F-8F8B-D25AE6D5CF75}" type="datetimeFigureOut">
               <a:rPr lang="en-US" smtClean="0"/>
-              <a:t>5/13/2020</a:t>
+              <a:t>5/18/2020</a:t>
             </a:fld>
             <a:endParaRPr lang="en-US"/>
           </a:p>
@@ -2087,7 +2091,7 @@
           <a:p>
             <a:fld id="{B054DD91-EB8A-463F-8F8B-D25AE6D5CF75}" type="datetimeFigureOut">
               <a:rPr lang="en-US" smtClean="0"/>
-              <a:t>5/13/2020</a:t>
+              <a:t>5/18/2020</a:t>
             </a:fld>
             <a:endParaRPr lang="en-US"/>
           </a:p>
@@ -2398,7 +2402,7 @@
           <a:p>
             <a:fld id="{B054DD91-EB8A-463F-8F8B-D25AE6D5CF75}" type="datetimeFigureOut">
               <a:rPr lang="en-US" smtClean="0"/>
-              <a:t>5/13/2020</a:t>
+              <a:t>5/18/2020</a:t>
             </a:fld>
             <a:endParaRPr lang="en-US"/>
           </a:p>
@@ -2686,7 +2690,7 @@
           <a:p>
             <a:fld id="{B054DD91-EB8A-463F-8F8B-D25AE6D5CF75}" type="datetimeFigureOut">
               <a:rPr lang="en-US" smtClean="0"/>
-              <a:t>5/13/2020</a:t>
+              <a:t>5/18/2020</a:t>
             </a:fld>
             <a:endParaRPr lang="en-US"/>
           </a:p>
@@ -2927,7 +2931,7 @@
           <a:p>
             <a:fld id="{B054DD91-EB8A-463F-8F8B-D25AE6D5CF75}" type="datetimeFigureOut">
               <a:rPr lang="en-US" smtClean="0"/>
-              <a:t>5/13/2020</a:t>
+              <a:t>5/18/2020</a:t>
             </a:fld>
             <a:endParaRPr lang="en-US"/>
           </a:p>
@@ -5679,7 +5683,9 @@
         </p:nvSpPr>
         <p:spPr/>
         <p:txBody>
-          <a:bodyPr/>
+          <a:bodyPr>
+            <a:normAutofit/>
+          </a:bodyPr>
           <a:lstStyle/>
           <a:p>
             <a:r>
@@ -5736,6 +5742,269 @@
           <p:cNvPr id="2" name="Title 1">
             <a:extLst>
               <a:ext uri="{FF2B5EF4-FFF2-40B4-BE49-F238E27FC236}">
+                <a16:creationId xmlns:a16="http://schemas.microsoft.com/office/drawing/2014/main" id="{765E518C-CF11-4F9B-BE75-519EFF21EC90}"/>
+              </a:ext>
+            </a:extLst>
+          </p:cNvPr>
+          <p:cNvSpPr>
+            <a:spLocks noGrp="1"/>
+          </p:cNvSpPr>
+          <p:nvPr>
+            <p:ph type="title"/>
+          </p:nvPr>
+        </p:nvSpPr>
+        <p:spPr/>
+        <p:txBody>
+          <a:bodyPr/>
+          <a:lstStyle/>
+          <a:p>
+            <a:r>
+              <a:rPr lang="en-US" dirty="0"/>
+              <a:t>Col-</a:t>
+            </a:r>
+            <a:r>
+              <a:rPr lang="hy-AM" dirty="0"/>
+              <a:t>երի </a:t>
+            </a:r>
+            <a:r>
+              <a:rPr lang="en-US" dirty="0"/>
+              <a:t>width-</a:t>
+            </a:r>
+            <a:r>
+              <a:rPr lang="hy-AM" dirty="0"/>
+              <a:t>եր</a:t>
+            </a:r>
+            <a:endParaRPr lang="en-US" dirty="0"/>
+          </a:p>
+        </p:txBody>
+      </p:sp>
+      <p:sp>
+        <p:nvSpPr>
+          <p:cNvPr id="3" name="Content Placeholder 2">
+            <a:extLst>
+              <a:ext uri="{FF2B5EF4-FFF2-40B4-BE49-F238E27FC236}">
+                <a16:creationId xmlns:a16="http://schemas.microsoft.com/office/drawing/2014/main" id="{1F019DDF-59A2-42B8-A1B2-33AD351DF7A6}"/>
+              </a:ext>
+            </a:extLst>
+          </p:cNvPr>
+          <p:cNvSpPr>
+            <a:spLocks noGrp="1"/>
+          </p:cNvSpPr>
+          <p:nvPr>
+            <p:ph idx="1"/>
+          </p:nvPr>
+        </p:nvSpPr>
+        <p:spPr/>
+        <p:txBody>
+          <a:bodyPr/>
+          <a:lstStyle/>
+          <a:p>
+            <a:r>
+              <a:rPr lang="en-US" dirty="0"/>
+              <a:t>.col - &lt; 576px</a:t>
+            </a:r>
+          </a:p>
+          <a:p>
+            <a:r>
+              <a:rPr lang="en-US" dirty="0"/>
+              <a:t>.col-</a:t>
+            </a:r>
+            <a:r>
+              <a:rPr lang="en-US" dirty="0" err="1"/>
+              <a:t>sm</a:t>
+            </a:r>
+            <a:r>
+              <a:rPr lang="en-US" dirty="0"/>
+              <a:t> – &gt;=576px  &amp;&amp; &lt; 768px</a:t>
+            </a:r>
+          </a:p>
+          <a:p>
+            <a:r>
+              <a:rPr lang="en-US" dirty="0"/>
+              <a:t>.col-md - &gt;= 768px  &amp;&amp; &lt; 992px</a:t>
+            </a:r>
+          </a:p>
+          <a:p>
+            <a:r>
+              <a:rPr lang="en-US" dirty="0"/>
+              <a:t>.col-lg &gt;= 992px &amp;&amp; &lt; 1200px</a:t>
+            </a:r>
+          </a:p>
+          <a:p>
+            <a:r>
+              <a:rPr lang="en-US" dirty="0"/>
+              <a:t>.col-xl &gt;= 1200px</a:t>
+            </a:r>
+          </a:p>
+          <a:p>
+            <a:endParaRPr lang="en-US" dirty="0"/>
+          </a:p>
+          <a:p>
+            <a:r>
+              <a:rPr lang="en-US" dirty="0"/>
+              <a:t>Px – </a:t>
+            </a:r>
+            <a:r>
+              <a:rPr lang="en-US" dirty="0" err="1"/>
+              <a:t>pt</a:t>
+            </a:r>
+            <a:r>
+              <a:rPr lang="en-US" dirty="0"/>
+              <a:t> – </a:t>
+            </a:r>
+            <a:r>
+              <a:rPr lang="en-US" dirty="0" err="1"/>
+              <a:t>em</a:t>
+            </a:r>
+            <a:r>
+              <a:rPr lang="en-US" dirty="0"/>
+              <a:t> – </a:t>
+            </a:r>
+            <a:r>
+              <a:rPr lang="hy-AM" dirty="0"/>
+              <a:t>չափման միավորներ</a:t>
+            </a:r>
+            <a:endParaRPr lang="en-US" dirty="0"/>
+          </a:p>
+          <a:p>
+            <a:endParaRPr lang="en-US" dirty="0"/>
+          </a:p>
+        </p:txBody>
+      </p:sp>
+    </p:spTree>
+    <p:extLst>
+      <p:ext uri="{BB962C8B-B14F-4D97-AF65-F5344CB8AC3E}">
+        <p14:creationId xmlns:p14="http://schemas.microsoft.com/office/powerpoint/2010/main" val="3531462398"/>
+      </p:ext>
+    </p:extLst>
+  </p:cSld>
+  <p:clrMapOvr>
+    <a:masterClrMapping/>
+  </p:clrMapOvr>
+</p:sld>
+</file>
+
+<file path=ppt/slides/slide18.xml><?xml version="1.0" encoding="utf-8"?>
+<p:sld xmlns:a="http://schemas.openxmlformats.org/drawingml/2006/main" xmlns:r="http://schemas.openxmlformats.org/officeDocument/2006/relationships" xmlns:p="http://schemas.openxmlformats.org/presentationml/2006/main">
+  <p:cSld>
+    <p:spTree>
+      <p:nvGrpSpPr>
+        <p:cNvPr id="1" name=""/>
+        <p:cNvGrpSpPr/>
+        <p:nvPr/>
+      </p:nvGrpSpPr>
+      <p:grpSpPr>
+        <a:xfrm>
+          <a:off x="0" y="0"/>
+          <a:ext cx="0" cy="0"/>
+          <a:chOff x="0" y="0"/>
+          <a:chExt cx="0" cy="0"/>
+        </a:xfrm>
+      </p:grpSpPr>
+      <p:sp>
+        <p:nvSpPr>
+          <p:cNvPr id="2" name="Title 1">
+            <a:extLst>
+              <a:ext uri="{FF2B5EF4-FFF2-40B4-BE49-F238E27FC236}">
+                <a16:creationId xmlns:a16="http://schemas.microsoft.com/office/drawing/2014/main" id="{D2421E35-09BE-4AD3-A9CF-9BB8D16D42FC}"/>
+              </a:ext>
+            </a:extLst>
+          </p:cNvPr>
+          <p:cNvSpPr>
+            <a:spLocks noGrp="1"/>
+          </p:cNvSpPr>
+          <p:nvPr>
+            <p:ph type="title"/>
+          </p:nvPr>
+        </p:nvSpPr>
+        <p:spPr/>
+        <p:txBody>
+          <a:bodyPr/>
+          <a:lstStyle/>
+          <a:p>
+            <a:endParaRPr lang="en-US"/>
+          </a:p>
+        </p:txBody>
+      </p:sp>
+      <p:sp>
+        <p:nvSpPr>
+          <p:cNvPr id="3" name="Content Placeholder 2">
+            <a:extLst>
+              <a:ext uri="{FF2B5EF4-FFF2-40B4-BE49-F238E27FC236}">
+                <a16:creationId xmlns:a16="http://schemas.microsoft.com/office/drawing/2014/main" id="{FC0EB5C2-A12A-4E1C-93D8-AA9DB7458816}"/>
+              </a:ext>
+            </a:extLst>
+          </p:cNvPr>
+          <p:cNvSpPr>
+            <a:spLocks noGrp="1"/>
+          </p:cNvSpPr>
+          <p:nvPr>
+            <p:ph idx="1"/>
+          </p:nvPr>
+        </p:nvSpPr>
+        <p:spPr/>
+        <p:txBody>
+          <a:bodyPr/>
+          <a:lstStyle/>
+          <a:p>
+            <a:r>
+              <a:rPr lang="en-US" sz="1400" dirty="0"/>
+              <a:t>Code execution sequence – </a:t>
+            </a:r>
+            <a:r>
+              <a:rPr lang="hy-AM" sz="1400" dirty="0"/>
+              <a:t>կոդի կատարման հաջորդականություն, </a:t>
+            </a:r>
+            <a:r>
+              <a:rPr lang="en-US" sz="1400" dirty="0"/>
+              <a:t>FIFO – First input first output – queue -</a:t>
+            </a:r>
+            <a:r>
+              <a:rPr lang="hy-AM" sz="1400" dirty="0"/>
+              <a:t>հերթ</a:t>
+            </a:r>
+            <a:endParaRPr lang="en-US" sz="1400" dirty="0"/>
+          </a:p>
+          <a:p>
+            <a:endParaRPr lang="en-US" dirty="0"/>
+          </a:p>
+        </p:txBody>
+      </p:sp>
+    </p:spTree>
+    <p:extLst>
+      <p:ext uri="{BB962C8B-B14F-4D97-AF65-F5344CB8AC3E}">
+        <p14:creationId xmlns:p14="http://schemas.microsoft.com/office/powerpoint/2010/main" val="3150687642"/>
+      </p:ext>
+    </p:extLst>
+  </p:cSld>
+  <p:clrMapOvr>
+    <a:masterClrMapping/>
+  </p:clrMapOvr>
+</p:sld>
+</file>
+
+<file path=ppt/slides/slide19.xml><?xml version="1.0" encoding="utf-8"?>
+<p:sld xmlns:a="http://schemas.openxmlformats.org/drawingml/2006/main" xmlns:r="http://schemas.openxmlformats.org/officeDocument/2006/relationships" xmlns:p="http://schemas.openxmlformats.org/presentationml/2006/main">
+  <p:cSld>
+    <p:spTree>
+      <p:nvGrpSpPr>
+        <p:cNvPr id="1" name=""/>
+        <p:cNvGrpSpPr/>
+        <p:nvPr/>
+      </p:nvGrpSpPr>
+      <p:grpSpPr>
+        <a:xfrm>
+          <a:off x="0" y="0"/>
+          <a:ext cx="0" cy="0"/>
+          <a:chOff x="0" y="0"/>
+          <a:chExt cx="0" cy="0"/>
+        </a:xfrm>
+      </p:grpSpPr>
+      <p:sp>
+        <p:nvSpPr>
+          <p:cNvPr id="2" name="Title 1">
+            <a:extLst>
+              <a:ext uri="{FF2B5EF4-FFF2-40B4-BE49-F238E27FC236}">
                 <a16:creationId xmlns:a16="http://schemas.microsoft.com/office/drawing/2014/main" id="{881CE79B-0D8F-46CE-84BE-5446DFC78CEF}"/>
               </a:ext>
             </a:extLst>
@@ -5747,7 +6016,12 @@
             <p:ph type="title"/>
           </p:nvPr>
         </p:nvSpPr>
-        <p:spPr/>
+        <p:spPr>
+          <a:xfrm>
+            <a:off x="855785" y="248993"/>
+            <a:ext cx="10515600" cy="1325563"/>
+          </a:xfrm>
+        </p:spPr>
         <p:txBody>
           <a:bodyPr>
             <a:normAutofit/>
@@ -6561,7 +6835,470 @@
 </p:sld>
 </file>
 
-<file path=ppt/slides/slide18.xml><?xml version="1.0" encoding="utf-8"?>
+<file path=ppt/slides/slide2.xml><?xml version="1.0" encoding="utf-8"?>
+<p:sld xmlns:a="http://schemas.openxmlformats.org/drawingml/2006/main" xmlns:r="http://schemas.openxmlformats.org/officeDocument/2006/relationships" xmlns:p="http://schemas.openxmlformats.org/presentationml/2006/main">
+  <p:cSld>
+    <p:spTree>
+      <p:nvGrpSpPr>
+        <p:cNvPr id="1" name=""/>
+        <p:cNvGrpSpPr/>
+        <p:nvPr/>
+      </p:nvGrpSpPr>
+      <p:grpSpPr>
+        <a:xfrm>
+          <a:off x="0" y="0"/>
+          <a:ext cx="0" cy="0"/>
+          <a:chOff x="0" y="0"/>
+          <a:chExt cx="0" cy="0"/>
+        </a:xfrm>
+      </p:grpSpPr>
+      <p:sp>
+        <p:nvSpPr>
+          <p:cNvPr id="2" name="Title 1">
+            <a:extLst>
+              <a:ext uri="{FF2B5EF4-FFF2-40B4-BE49-F238E27FC236}">
+                <a16:creationId xmlns:a16="http://schemas.microsoft.com/office/drawing/2014/main" id="{ACC2CDED-388C-448B-9554-0BD11C74A7C6}"/>
+              </a:ext>
+            </a:extLst>
+          </p:cNvPr>
+          <p:cNvSpPr>
+            <a:spLocks noGrp="1"/>
+          </p:cNvSpPr>
+          <p:nvPr>
+            <p:ph type="title"/>
+          </p:nvPr>
+        </p:nvSpPr>
+        <p:spPr/>
+        <p:txBody>
+          <a:bodyPr/>
+          <a:lstStyle/>
+          <a:p>
+            <a:r>
+              <a:rPr lang="hy-AM" dirty="0">
+                <a:solidFill>
+                  <a:srgbClr val="FF0000"/>
+                </a:solidFill>
+              </a:rPr>
+              <a:t>Դասի գլխավոր նպատակները</a:t>
+            </a:r>
+            <a:endParaRPr lang="en-US" dirty="0">
+              <a:solidFill>
+                <a:srgbClr val="FF0000"/>
+              </a:solidFill>
+            </a:endParaRPr>
+          </a:p>
+        </p:txBody>
+      </p:sp>
+      <p:sp>
+        <p:nvSpPr>
+          <p:cNvPr id="5" name="Content Placeholder 4">
+            <a:extLst>
+              <a:ext uri="{FF2B5EF4-FFF2-40B4-BE49-F238E27FC236}">
+                <a16:creationId xmlns:a16="http://schemas.microsoft.com/office/drawing/2014/main" id="{472A7298-A4E1-4B65-9089-FD6507D7356A}"/>
+              </a:ext>
+            </a:extLst>
+          </p:cNvPr>
+          <p:cNvSpPr>
+            <a:spLocks noGrp="1"/>
+          </p:cNvSpPr>
+          <p:nvPr>
+            <p:ph idx="1"/>
+          </p:nvPr>
+        </p:nvSpPr>
+        <p:spPr/>
+        <p:txBody>
+          <a:bodyPr/>
+          <a:lstStyle/>
+          <a:p>
+            <a:r>
+              <a:rPr lang="en-US" sz="2000" dirty="0"/>
+              <a:t>HTML</a:t>
+            </a:r>
+            <a:r>
+              <a:rPr lang="hy-AM" sz="2000" dirty="0"/>
+              <a:t> -</a:t>
+            </a:r>
+            <a:r>
+              <a:rPr lang="en-US" sz="2000" dirty="0"/>
+              <a:t> </a:t>
+            </a:r>
+            <a:r>
+              <a:rPr lang="en-US" sz="2000" b="1" dirty="0"/>
+              <a:t>H</a:t>
+            </a:r>
+            <a:r>
+              <a:rPr lang="en-US" sz="2000" dirty="0"/>
+              <a:t>yper </a:t>
+            </a:r>
+            <a:r>
+              <a:rPr lang="en-US" sz="2000" b="1" dirty="0"/>
+              <a:t>T</a:t>
+            </a:r>
+            <a:r>
+              <a:rPr lang="en-US" sz="2000" dirty="0"/>
+              <a:t>ext </a:t>
+            </a:r>
+            <a:r>
+              <a:rPr lang="en-US" sz="2000" b="1" dirty="0"/>
+              <a:t>M</a:t>
+            </a:r>
+            <a:r>
+              <a:rPr lang="en-US" sz="2000" dirty="0"/>
+              <a:t>arkup </a:t>
+            </a:r>
+            <a:r>
+              <a:rPr lang="en-US" sz="2000" b="1" dirty="0"/>
+              <a:t>L</a:t>
+            </a:r>
+            <a:r>
+              <a:rPr lang="en-US" sz="2000" dirty="0"/>
+              <a:t>anguage &lt;&gt; XML</a:t>
+            </a:r>
+            <a:endParaRPr lang="hy-AM" sz="2000" dirty="0"/>
+          </a:p>
+          <a:p>
+            <a:r>
+              <a:rPr lang="en-US" sz="2000" dirty="0"/>
+              <a:t>Tag-</a:t>
+            </a:r>
+            <a:r>
+              <a:rPr lang="hy-AM" sz="2000" dirty="0"/>
+              <a:t>երի հետ ծանոթություն</a:t>
+            </a:r>
+            <a:endParaRPr lang="en-US" sz="2000" dirty="0"/>
+          </a:p>
+          <a:p>
+            <a:r>
+              <a:rPr lang="hy-AM" sz="2000" dirty="0"/>
+              <a:t>Ինչ է </a:t>
+            </a:r>
+            <a:r>
+              <a:rPr lang="en-US" sz="2000" dirty="0"/>
+              <a:t>Layout-</a:t>
+            </a:r>
+            <a:r>
+              <a:rPr lang="hy-AM" sz="2000" dirty="0"/>
+              <a:t>ը</a:t>
+            </a:r>
+            <a:endParaRPr lang="en-US" sz="2000" dirty="0"/>
+          </a:p>
+          <a:p>
+            <a:r>
+              <a:rPr lang="hy-AM" sz="2000" dirty="0"/>
+              <a:t>Նախնական պատկերացում </a:t>
+            </a:r>
+            <a:r>
+              <a:rPr lang="en-US" sz="2000" dirty="0"/>
+              <a:t>CCS-</a:t>
+            </a:r>
+            <a:r>
+              <a:rPr lang="hy-AM" sz="2000" dirty="0"/>
+              <a:t>ի մասին</a:t>
+            </a:r>
+          </a:p>
+          <a:p>
+            <a:r>
+              <a:rPr lang="en-US" sz="2000" dirty="0"/>
+              <a:t>Bootstrap</a:t>
+            </a:r>
+          </a:p>
+          <a:p>
+            <a:r>
+              <a:rPr lang="hy-AM" sz="2000" dirty="0"/>
+              <a:t>Փոփոխականներ և նրանց տիպերը </a:t>
+            </a:r>
+            <a:r>
+              <a:rPr lang="en-US" sz="2000" dirty="0"/>
+              <a:t>JavaScript-um </a:t>
+            </a:r>
+            <a:r>
+              <a:rPr lang="hy-AM" sz="2000" dirty="0"/>
+              <a:t>և </a:t>
+            </a:r>
+            <a:r>
+              <a:rPr lang="en-US" sz="2000" dirty="0"/>
+              <a:t>PHP-</a:t>
+            </a:r>
+            <a:r>
+              <a:rPr lang="hy-AM" sz="2000" dirty="0"/>
+              <a:t>ում</a:t>
+            </a:r>
+            <a:endParaRPr lang="en-US" sz="2000" dirty="0"/>
+          </a:p>
+          <a:p>
+            <a:r>
+              <a:rPr lang="en-US" sz="2000" dirty="0" err="1"/>
+              <a:t>Javascript</a:t>
+            </a:r>
+            <a:r>
+              <a:rPr lang="en-US" sz="2000" dirty="0"/>
+              <a:t>/</a:t>
+            </a:r>
+            <a:r>
+              <a:rPr lang="en-US" sz="2000" dirty="0" err="1"/>
+              <a:t>JQuery</a:t>
+            </a:r>
+            <a:r>
+              <a:rPr lang="en-US" sz="2000" dirty="0"/>
+              <a:t>: </a:t>
+            </a:r>
+            <a:r>
+              <a:rPr lang="hy-AM" sz="2000" dirty="0"/>
+              <a:t>Առաջադրանք նկարների փոխելու մասին</a:t>
+            </a:r>
+            <a:endParaRPr lang="en-US" sz="2000" dirty="0"/>
+          </a:p>
+          <a:p>
+            <a:r>
+              <a:rPr lang="en-US" sz="2000" dirty="0"/>
+              <a:t>PHP: </a:t>
+            </a:r>
+            <a:r>
+              <a:rPr lang="hy-AM" sz="2000" dirty="0"/>
+              <a:t>Առաջադրանք նահանջ տարի</a:t>
+            </a:r>
+            <a:endParaRPr lang="en-US" sz="2000" dirty="0"/>
+          </a:p>
+          <a:p>
+            <a:endParaRPr lang="en-US" dirty="0"/>
+          </a:p>
+        </p:txBody>
+      </p:sp>
+    </p:spTree>
+    <p:extLst>
+      <p:ext uri="{BB962C8B-B14F-4D97-AF65-F5344CB8AC3E}">
+        <p14:creationId xmlns:p14="http://schemas.microsoft.com/office/powerpoint/2010/main" val="1026634551"/>
+      </p:ext>
+    </p:extLst>
+  </p:cSld>
+  <p:clrMapOvr>
+    <a:masterClrMapping/>
+  </p:clrMapOvr>
+</p:sld>
+</file>
+
+<file path=ppt/slides/slide20.xml><?xml version="1.0" encoding="utf-8"?>
+<p:sld xmlns:a="http://schemas.openxmlformats.org/drawingml/2006/main" xmlns:r="http://schemas.openxmlformats.org/officeDocument/2006/relationships" xmlns:p="http://schemas.openxmlformats.org/presentationml/2006/main">
+  <p:cSld>
+    <p:spTree>
+      <p:nvGrpSpPr>
+        <p:cNvPr id="1" name=""/>
+        <p:cNvGrpSpPr/>
+        <p:nvPr/>
+      </p:nvGrpSpPr>
+      <p:grpSpPr>
+        <a:xfrm>
+          <a:off x="0" y="0"/>
+          <a:ext cx="0" cy="0"/>
+          <a:chOff x="0" y="0"/>
+          <a:chExt cx="0" cy="0"/>
+        </a:xfrm>
+      </p:grpSpPr>
+      <p:sp>
+        <p:nvSpPr>
+          <p:cNvPr id="5" name="Title 4">
+            <a:extLst>
+              <a:ext uri="{FF2B5EF4-FFF2-40B4-BE49-F238E27FC236}">
+                <a16:creationId xmlns:a16="http://schemas.microsoft.com/office/drawing/2014/main" id="{12E8864C-2BF9-41D8-90A0-2C125260FD80}"/>
+              </a:ext>
+            </a:extLst>
+          </p:cNvPr>
+          <p:cNvSpPr>
+            <a:spLocks noGrp="1"/>
+          </p:cNvSpPr>
+          <p:nvPr>
+            <p:ph type="title"/>
+          </p:nvPr>
+        </p:nvSpPr>
+        <p:spPr>
+          <a:xfrm>
+            <a:off x="838200" y="365125"/>
+            <a:ext cx="10515600" cy="900967"/>
+          </a:xfrm>
+        </p:spPr>
+        <p:txBody>
+          <a:bodyPr/>
+          <a:lstStyle/>
+          <a:p>
+            <a:r>
+              <a:rPr lang="en-US" dirty="0">
+                <a:solidFill>
+                  <a:srgbClr val="FF0000"/>
+                </a:solidFill>
+              </a:rPr>
+              <a:t>Detailed info about JS variables</a:t>
+            </a:r>
+          </a:p>
+        </p:txBody>
+      </p:sp>
+      <p:sp>
+        <p:nvSpPr>
+          <p:cNvPr id="9" name="Content Placeholder 8">
+            <a:extLst>
+              <a:ext uri="{FF2B5EF4-FFF2-40B4-BE49-F238E27FC236}">
+                <a16:creationId xmlns:a16="http://schemas.microsoft.com/office/drawing/2014/main" id="{947CC459-E2EB-46DD-87B8-DE0A54855375}"/>
+              </a:ext>
+            </a:extLst>
+          </p:cNvPr>
+          <p:cNvSpPr>
+            <a:spLocks noGrp="1"/>
+          </p:cNvSpPr>
+          <p:nvPr>
+            <p:ph idx="1"/>
+          </p:nvPr>
+        </p:nvSpPr>
+        <p:spPr/>
+        <p:txBody>
+          <a:bodyPr/>
+          <a:lstStyle/>
+          <a:p>
+            <a:endParaRPr lang="en-US"/>
+          </a:p>
+        </p:txBody>
+      </p:sp>
+      <p:pic>
+        <p:nvPicPr>
+          <p:cNvPr id="10" name="Picture 9">
+            <a:extLst>
+              <a:ext uri="{FF2B5EF4-FFF2-40B4-BE49-F238E27FC236}">
+                <a16:creationId xmlns:a16="http://schemas.microsoft.com/office/drawing/2014/main" id="{F6CE26B2-323D-40E5-ACD9-30BA86C158B8}"/>
+              </a:ext>
+            </a:extLst>
+          </p:cNvPr>
+          <p:cNvPicPr>
+            <a:picLocks noChangeAspect="1"/>
+          </p:cNvPicPr>
+          <p:nvPr/>
+        </p:nvPicPr>
+        <p:blipFill>
+          <a:blip r:embed="rId2"/>
+          <a:stretch>
+            <a:fillRect/>
+          </a:stretch>
+        </p:blipFill>
+        <p:spPr>
+          <a:xfrm>
+            <a:off x="690464" y="1492898"/>
+            <a:ext cx="11501535" cy="4842588"/>
+          </a:xfrm>
+          <a:prstGeom prst="rect">
+            <a:avLst/>
+          </a:prstGeom>
+        </p:spPr>
+      </p:pic>
+    </p:spTree>
+    <p:extLst>
+      <p:ext uri="{BB962C8B-B14F-4D97-AF65-F5344CB8AC3E}">
+        <p14:creationId xmlns:p14="http://schemas.microsoft.com/office/powerpoint/2010/main" val="3159011066"/>
+      </p:ext>
+    </p:extLst>
+  </p:cSld>
+  <p:clrMapOvr>
+    <a:masterClrMapping/>
+  </p:clrMapOvr>
+</p:sld>
+</file>
+
+<file path=ppt/slides/slide21.xml><?xml version="1.0" encoding="utf-8"?>
+<p:sld xmlns:a="http://schemas.openxmlformats.org/drawingml/2006/main" xmlns:r="http://schemas.openxmlformats.org/officeDocument/2006/relationships" xmlns:p="http://schemas.openxmlformats.org/presentationml/2006/main">
+  <p:cSld>
+    <p:spTree>
+      <p:nvGrpSpPr>
+        <p:cNvPr id="1" name=""/>
+        <p:cNvGrpSpPr/>
+        <p:nvPr/>
+      </p:nvGrpSpPr>
+      <p:grpSpPr>
+        <a:xfrm>
+          <a:off x="0" y="0"/>
+          <a:ext cx="0" cy="0"/>
+          <a:chOff x="0" y="0"/>
+          <a:chExt cx="0" cy="0"/>
+        </a:xfrm>
+      </p:grpSpPr>
+      <p:sp>
+        <p:nvSpPr>
+          <p:cNvPr id="2" name="Title 1">
+            <a:extLst>
+              <a:ext uri="{FF2B5EF4-FFF2-40B4-BE49-F238E27FC236}">
+                <a16:creationId xmlns:a16="http://schemas.microsoft.com/office/drawing/2014/main" id="{5BF5DA38-D4B5-4967-8A5E-A903CEF3F434}"/>
+              </a:ext>
+            </a:extLst>
+          </p:cNvPr>
+          <p:cNvSpPr>
+            <a:spLocks noGrp="1"/>
+          </p:cNvSpPr>
+          <p:nvPr>
+            <p:ph type="title"/>
+          </p:nvPr>
+        </p:nvSpPr>
+        <p:spPr>
+          <a:xfrm>
+            <a:off x="923193" y="576141"/>
+            <a:ext cx="10515600" cy="1325563"/>
+          </a:xfrm>
+        </p:spPr>
+        <p:txBody>
+          <a:bodyPr/>
+          <a:lstStyle/>
+          <a:p>
+            <a:r>
+              <a:rPr lang="en-US" dirty="0">
+                <a:solidFill>
+                  <a:srgbClr val="FF0000"/>
+                </a:solidFill>
+              </a:rPr>
+              <a:t>Detailed info about JS variables</a:t>
+            </a:r>
+          </a:p>
+        </p:txBody>
+      </p:sp>
+      <p:pic>
+        <p:nvPicPr>
+          <p:cNvPr id="4" name="Content Placeholder 3">
+            <a:extLst>
+              <a:ext uri="{FF2B5EF4-FFF2-40B4-BE49-F238E27FC236}">
+                <a16:creationId xmlns:a16="http://schemas.microsoft.com/office/drawing/2014/main" id="{59F004EE-125F-4A33-B7B1-464CD652BBD5}"/>
+              </a:ext>
+            </a:extLst>
+          </p:cNvPr>
+          <p:cNvPicPr>
+            <a:picLocks noGrp="1" noChangeAspect="1"/>
+          </p:cNvPicPr>
+          <p:nvPr>
+            <p:ph idx="1"/>
+          </p:nvPr>
+        </p:nvPicPr>
+        <p:blipFill>
+          <a:blip r:embed="rId2"/>
+          <a:stretch>
+            <a:fillRect/>
+          </a:stretch>
+        </p:blipFill>
+        <p:spPr>
+          <a:xfrm>
+            <a:off x="923193" y="2135248"/>
+            <a:ext cx="8610600" cy="3419475"/>
+          </a:xfrm>
+          <a:prstGeom prst="rect">
+            <a:avLst/>
+          </a:prstGeom>
+        </p:spPr>
+      </p:pic>
+    </p:spTree>
+    <p:extLst>
+      <p:ext uri="{BB962C8B-B14F-4D97-AF65-F5344CB8AC3E}">
+        <p14:creationId xmlns:p14="http://schemas.microsoft.com/office/powerpoint/2010/main" val="1220374033"/>
+      </p:ext>
+    </p:extLst>
+  </p:cSld>
+  <p:clrMapOvr>
+    <a:masterClrMapping/>
+  </p:clrMapOvr>
+</p:sld>
+</file>
+
+<file path=ppt/slides/slide22.xml><?xml version="1.0" encoding="utf-8"?>
 <p:sld xmlns:a="http://schemas.openxmlformats.org/drawingml/2006/main" xmlns:r="http://schemas.openxmlformats.org/officeDocument/2006/relationships" xmlns:p="http://schemas.openxmlformats.org/presentationml/2006/main">
   <p:cSld>
     <p:spTree>
@@ -6915,7 +7652,7 @@
 </p:sld>
 </file>
 
-<file path=ppt/slides/slide19.xml><?xml version="1.0" encoding="utf-8"?>
+<file path=ppt/slides/slide23.xml><?xml version="1.0" encoding="utf-8"?>
 <p:sld xmlns:a="http://schemas.openxmlformats.org/drawingml/2006/main" xmlns:r="http://schemas.openxmlformats.org/officeDocument/2006/relationships" xmlns:p="http://schemas.openxmlformats.org/presentationml/2006/main">
   <p:cSld>
     <p:spTree>
@@ -7018,248 +7755,6 @@
     <p:extLst>
       <p:ext uri="{BB962C8B-B14F-4D97-AF65-F5344CB8AC3E}">
         <p14:creationId xmlns:p14="http://schemas.microsoft.com/office/powerpoint/2010/main" val="4233018801"/>
-      </p:ext>
-    </p:extLst>
-  </p:cSld>
-  <p:clrMapOvr>
-    <a:masterClrMapping/>
-  </p:clrMapOvr>
-</p:sld>
-</file>
-
-<file path=ppt/slides/slide2.xml><?xml version="1.0" encoding="utf-8"?>
-<p:sld xmlns:a="http://schemas.openxmlformats.org/drawingml/2006/main" xmlns:r="http://schemas.openxmlformats.org/officeDocument/2006/relationships" xmlns:p="http://schemas.openxmlformats.org/presentationml/2006/main">
-  <p:cSld>
-    <p:spTree>
-      <p:nvGrpSpPr>
-        <p:cNvPr id="1" name=""/>
-        <p:cNvGrpSpPr/>
-        <p:nvPr/>
-      </p:nvGrpSpPr>
-      <p:grpSpPr>
-        <a:xfrm>
-          <a:off x="0" y="0"/>
-          <a:ext cx="0" cy="0"/>
-          <a:chOff x="0" y="0"/>
-          <a:chExt cx="0" cy="0"/>
-        </a:xfrm>
-      </p:grpSpPr>
-      <p:sp>
-        <p:nvSpPr>
-          <p:cNvPr id="2" name="Title 1">
-            <a:extLst>
-              <a:ext uri="{FF2B5EF4-FFF2-40B4-BE49-F238E27FC236}">
-                <a16:creationId xmlns:a16="http://schemas.microsoft.com/office/drawing/2014/main" id="{ACC2CDED-388C-448B-9554-0BD11C74A7C6}"/>
-              </a:ext>
-            </a:extLst>
-          </p:cNvPr>
-          <p:cNvSpPr>
-            <a:spLocks noGrp="1"/>
-          </p:cNvSpPr>
-          <p:nvPr>
-            <p:ph type="title"/>
-          </p:nvPr>
-        </p:nvSpPr>
-        <p:spPr/>
-        <p:txBody>
-          <a:bodyPr/>
-          <a:lstStyle/>
-          <a:p>
-            <a:r>
-              <a:rPr lang="hy-AM" dirty="0">
-                <a:solidFill>
-                  <a:srgbClr val="FF0000"/>
-                </a:solidFill>
-              </a:rPr>
-              <a:t>Դասի գլխավոր նպատակները</a:t>
-            </a:r>
-            <a:endParaRPr lang="en-US" dirty="0">
-              <a:solidFill>
-                <a:srgbClr val="FF0000"/>
-              </a:solidFill>
-            </a:endParaRPr>
-          </a:p>
-        </p:txBody>
-      </p:sp>
-      <p:sp>
-        <p:nvSpPr>
-          <p:cNvPr id="5" name="Content Placeholder 4">
-            <a:extLst>
-              <a:ext uri="{FF2B5EF4-FFF2-40B4-BE49-F238E27FC236}">
-                <a16:creationId xmlns:a16="http://schemas.microsoft.com/office/drawing/2014/main" id="{472A7298-A4E1-4B65-9089-FD6507D7356A}"/>
-              </a:ext>
-            </a:extLst>
-          </p:cNvPr>
-          <p:cNvSpPr>
-            <a:spLocks noGrp="1"/>
-          </p:cNvSpPr>
-          <p:nvPr>
-            <p:ph idx="1"/>
-          </p:nvPr>
-        </p:nvSpPr>
-        <p:spPr/>
-        <p:txBody>
-          <a:bodyPr/>
-          <a:lstStyle/>
-          <a:p>
-            <a:r>
-              <a:rPr lang="en-US" sz="2000" dirty="0"/>
-              <a:t>HTML</a:t>
-            </a:r>
-            <a:r>
-              <a:rPr lang="hy-AM" sz="2000" dirty="0"/>
-              <a:t> -</a:t>
-            </a:r>
-            <a:r>
-              <a:rPr lang="en-US" sz="2000" dirty="0"/>
-              <a:t> </a:t>
-            </a:r>
-            <a:r>
-              <a:rPr lang="en-US" sz="2000" b="1" dirty="0"/>
-              <a:t>H</a:t>
-            </a:r>
-            <a:r>
-              <a:rPr lang="en-US" sz="2000" dirty="0"/>
-              <a:t>yper </a:t>
-            </a:r>
-            <a:r>
-              <a:rPr lang="en-US" sz="2000" b="1" dirty="0"/>
-              <a:t>T</a:t>
-            </a:r>
-            <a:r>
-              <a:rPr lang="en-US" sz="2000" dirty="0"/>
-              <a:t>ext </a:t>
-            </a:r>
-            <a:r>
-              <a:rPr lang="en-US" sz="2000" b="1" dirty="0"/>
-              <a:t>M</a:t>
-            </a:r>
-            <a:r>
-              <a:rPr lang="en-US" sz="2000" dirty="0"/>
-              <a:t>arkup </a:t>
-            </a:r>
-            <a:r>
-              <a:rPr lang="en-US" sz="2000" b="1" dirty="0"/>
-              <a:t>L</a:t>
-            </a:r>
-            <a:r>
-              <a:rPr lang="en-US" sz="2000" dirty="0"/>
-              <a:t>anguage &lt;&gt; XML</a:t>
-            </a:r>
-            <a:endParaRPr lang="hy-AM" sz="2000" dirty="0"/>
-          </a:p>
-          <a:p>
-            <a:r>
-              <a:rPr lang="en-US" sz="2000" dirty="0"/>
-              <a:t>Tag-</a:t>
-            </a:r>
-            <a:r>
-              <a:rPr lang="hy-AM" sz="2000" dirty="0"/>
-              <a:t>երի հետ ծանոթություն</a:t>
-            </a:r>
-            <a:endParaRPr lang="en-US" sz="2000" dirty="0"/>
-          </a:p>
-          <a:p>
-            <a:r>
-              <a:rPr lang="hy-AM" sz="2000" dirty="0"/>
-              <a:t>Ինչ է </a:t>
-            </a:r>
-            <a:r>
-              <a:rPr lang="en-US" sz="2000" dirty="0"/>
-              <a:t>Layout-</a:t>
-            </a:r>
-            <a:r>
-              <a:rPr lang="hy-AM" sz="2000" dirty="0"/>
-              <a:t>ը</a:t>
-            </a:r>
-            <a:endParaRPr lang="en-US" sz="2000" dirty="0"/>
-          </a:p>
-          <a:p>
-            <a:r>
-              <a:rPr lang="hy-AM" sz="2000" dirty="0"/>
-              <a:t>Նախնական պատկերացում </a:t>
-            </a:r>
-            <a:r>
-              <a:rPr lang="en-US" sz="2000" dirty="0"/>
-              <a:t>CCS-</a:t>
-            </a:r>
-            <a:r>
-              <a:rPr lang="hy-AM" sz="2000" dirty="0"/>
-              <a:t>ի մասին</a:t>
-            </a:r>
-          </a:p>
-          <a:p>
-            <a:r>
-              <a:rPr lang="en-US" sz="2000" dirty="0"/>
-              <a:t>Bootstrap</a:t>
-            </a:r>
-          </a:p>
-          <a:p>
-            <a:r>
-              <a:rPr lang="hy-AM" sz="2000" dirty="0"/>
-              <a:t>Փոփոխականներ և նրանց տիպերը </a:t>
-            </a:r>
-            <a:r>
-              <a:rPr lang="en-US" sz="2000" dirty="0"/>
-              <a:t>JavaScript-um </a:t>
-            </a:r>
-            <a:r>
-              <a:rPr lang="hy-AM" sz="2000" dirty="0"/>
-              <a:t>և </a:t>
-            </a:r>
-            <a:r>
-              <a:rPr lang="en-US" sz="2000" dirty="0"/>
-              <a:t>PHP-</a:t>
-            </a:r>
-            <a:r>
-              <a:rPr lang="hy-AM" sz="2000" dirty="0"/>
-              <a:t>ում</a:t>
-            </a:r>
-            <a:endParaRPr lang="en-US" sz="2000" dirty="0"/>
-          </a:p>
-          <a:p>
-            <a:r>
-              <a:rPr lang="en-US" sz="2000" dirty="0" err="1"/>
-              <a:t>Javascript</a:t>
-            </a:r>
-            <a:r>
-              <a:rPr lang="en-US" sz="2000" dirty="0"/>
-              <a:t>/</a:t>
-            </a:r>
-            <a:r>
-              <a:rPr lang="en-US" sz="2000" dirty="0" err="1"/>
-              <a:t>JQuery</a:t>
-            </a:r>
-            <a:r>
-              <a:rPr lang="en-US" sz="2000" dirty="0"/>
-              <a:t>: </a:t>
-            </a:r>
-            <a:r>
-              <a:rPr lang="hy-AM" sz="2000" dirty="0"/>
-              <a:t>Առաջադրանք նկարների փոխելու մասին</a:t>
-            </a:r>
-            <a:endParaRPr lang="en-US" sz="2000" dirty="0"/>
-          </a:p>
-          <a:p>
-            <a:r>
-              <a:rPr lang="en-US" sz="2000" dirty="0"/>
-              <a:t>PHP: </a:t>
-            </a:r>
-            <a:r>
-              <a:rPr lang="hy-AM" sz="2000" dirty="0"/>
-              <a:t>Առաջադրանք նահանջ տարի</a:t>
-            </a:r>
-            <a:endParaRPr lang="en-US" sz="2000" dirty="0"/>
-          </a:p>
-          <a:p>
-            <a:endParaRPr lang="en-US" dirty="0"/>
-          </a:p>
-        </p:txBody>
-      </p:sp>
-    </p:spTree>
-    <p:extLst>
-      <p:ext uri="{BB962C8B-B14F-4D97-AF65-F5344CB8AC3E}">
-        <p14:creationId xmlns:p14="http://schemas.microsoft.com/office/powerpoint/2010/main" val="1026634551"/>
       </p:ext>
     </p:extLst>
   </p:cSld>

</xml_diff>